<commit_message>
Fixes clase 31. Chat de zoom
</commit_message>
<xml_diff>
--- a/Clases/04 - Propiedades de Quicksort y Ordenación/04. Propiedades de Quicksort.pptx
+++ b/Clases/04 - Propiedades de Quicksort y Ordenación/04. Propiedades de Quicksort.pptx
@@ -14541,10 +14541,10 @@
       </p:grpSpPr>
       <p:pic>
         <p:nvPicPr>
-          <p:cNvPr id="4" name="Picture 3">
+          <p:cNvPr id="3" name="Picture 2">
             <a:extLst>
               <a:ext uri="{FF2B5EF4-FFF2-40B4-BE49-F238E27FC236}">
-                <a16:creationId xmlns:a16="http://schemas.microsoft.com/office/drawing/2014/main" id="{C40279B0-AE7F-4EF2-9B3C-1C798D886E0A}"/>
+                <a16:creationId xmlns:a16="http://schemas.microsoft.com/office/drawing/2014/main" id="{62A9F4E0-B0B0-47BA-8D50-8FDBD92D292A}"/>
               </a:ext>
             </a:extLst>
           </p:cNvPr>
@@ -14561,14 +14561,475 @@
         </p:blipFill>
         <p:spPr>
           <a:xfrm>
-            <a:off x="1640593" y="714375"/>
-            <a:ext cx="5862814" cy="5429250"/>
+            <a:off x="1990724" y="708992"/>
+            <a:ext cx="5162552" cy="5154266"/>
           </a:xfrm>
           <a:prstGeom prst="rect">
             <a:avLst/>
           </a:prstGeom>
         </p:spPr>
       </p:pic>
+      <p:sp>
+        <p:nvSpPr>
+          <p:cNvPr id="5" name="TextBox 4">
+            <a:extLst>
+              <a:ext uri="{FF2B5EF4-FFF2-40B4-BE49-F238E27FC236}">
+                <a16:creationId xmlns:a16="http://schemas.microsoft.com/office/drawing/2014/main" id="{1B2C8D78-82C4-4CE7-8CCC-28696386599D}"/>
+              </a:ext>
+            </a:extLst>
+          </p:cNvPr>
+          <p:cNvSpPr txBox="1"/>
+          <p:nvPr/>
+        </p:nvSpPr>
+        <p:spPr>
+          <a:xfrm>
+            <a:off x="2695575" y="4829175"/>
+            <a:ext cx="301686" cy="369332"/>
+          </a:xfrm>
+          <a:prstGeom prst="rect">
+            <a:avLst/>
+          </a:prstGeom>
+          <a:noFill/>
+        </p:spPr>
+        <p:txBody>
+          <a:bodyPr wrap="none" rtlCol="0">
+            <a:spAutoFit/>
+          </a:bodyPr>
+          <a:lstStyle/>
+          <a:p>
+            <a:r>
+              <a:rPr lang="es-CL" dirty="0"/>
+              <a:t>1</a:t>
+            </a:r>
+          </a:p>
+        </p:txBody>
+      </p:sp>
+      <p:sp>
+        <p:nvSpPr>
+          <p:cNvPr id="6" name="TextBox 5">
+            <a:extLst>
+              <a:ext uri="{FF2B5EF4-FFF2-40B4-BE49-F238E27FC236}">
+                <a16:creationId xmlns:a16="http://schemas.microsoft.com/office/drawing/2014/main" id="{0D9BABB4-580E-40EE-81CD-57D6E58E69B4}"/>
+              </a:ext>
+            </a:extLst>
+          </p:cNvPr>
+          <p:cNvSpPr txBox="1"/>
+          <p:nvPr/>
+        </p:nvSpPr>
+        <p:spPr>
+          <a:xfrm>
+            <a:off x="3702112" y="5103257"/>
+            <a:ext cx="508473" cy="369332"/>
+          </a:xfrm>
+          <a:prstGeom prst="rect">
+            <a:avLst/>
+          </a:prstGeom>
+          <a:noFill/>
+        </p:spPr>
+        <p:txBody>
+          <a:bodyPr wrap="none" rtlCol="0">
+            <a:spAutoFit/>
+          </a:bodyPr>
+          <a:lstStyle/>
+          <a:p>
+            <a:r>
+              <a:rPr lang="es-CL" dirty="0"/>
+              <a:t>1/2</a:t>
+            </a:r>
+          </a:p>
+        </p:txBody>
+      </p:sp>
+      <p:sp>
+        <p:nvSpPr>
+          <p:cNvPr id="8" name="TextBox 7">
+            <a:extLst>
+              <a:ext uri="{FF2B5EF4-FFF2-40B4-BE49-F238E27FC236}">
+                <a16:creationId xmlns:a16="http://schemas.microsoft.com/office/drawing/2014/main" id="{361260F7-7EFA-4A5A-8BFE-EBF00F8DD789}"/>
+              </a:ext>
+            </a:extLst>
+          </p:cNvPr>
+          <p:cNvSpPr txBox="1"/>
+          <p:nvPr/>
+        </p:nvSpPr>
+        <p:spPr>
+          <a:xfrm>
+            <a:off x="4709184" y="5198507"/>
+            <a:ext cx="508473" cy="369332"/>
+          </a:xfrm>
+          <a:prstGeom prst="rect">
+            <a:avLst/>
+          </a:prstGeom>
+          <a:noFill/>
+        </p:spPr>
+        <p:txBody>
+          <a:bodyPr wrap="none" rtlCol="0">
+            <a:spAutoFit/>
+          </a:bodyPr>
+          <a:lstStyle/>
+          <a:p>
+            <a:r>
+              <a:rPr lang="es-CL" dirty="0"/>
+              <a:t>1/3</a:t>
+            </a:r>
+          </a:p>
+        </p:txBody>
+      </p:sp>
+      <p:sp>
+        <p:nvSpPr>
+          <p:cNvPr id="10" name="TextBox 9">
+            <a:extLst>
+              <a:ext uri="{FF2B5EF4-FFF2-40B4-BE49-F238E27FC236}">
+                <a16:creationId xmlns:a16="http://schemas.microsoft.com/office/drawing/2014/main" id="{EFB2F996-B25C-4801-802A-0A153E1C0566}"/>
+              </a:ext>
+            </a:extLst>
+          </p:cNvPr>
+          <p:cNvSpPr txBox="1"/>
+          <p:nvPr/>
+        </p:nvSpPr>
+        <p:spPr>
+          <a:xfrm>
+            <a:off x="5816662" y="5255657"/>
+            <a:ext cx="508473" cy="369332"/>
+          </a:xfrm>
+          <a:prstGeom prst="rect">
+            <a:avLst/>
+          </a:prstGeom>
+          <a:noFill/>
+        </p:spPr>
+        <p:txBody>
+          <a:bodyPr wrap="none" rtlCol="0">
+            <a:spAutoFit/>
+          </a:bodyPr>
+          <a:lstStyle/>
+          <a:p>
+            <a:r>
+              <a:rPr lang="es-CL" dirty="0"/>
+              <a:t>1/4</a:t>
+            </a:r>
+          </a:p>
+        </p:txBody>
+      </p:sp>
+      <mc:AlternateContent xmlns:mc="http://schemas.openxmlformats.org/markup-compatibility/2006">
+        <mc:Choice xmlns:a14="http://schemas.microsoft.com/office/drawing/2010/main" Requires="a14">
+          <p:sp>
+            <p:nvSpPr>
+              <p:cNvPr id="11" name="TextBox 10">
+                <a:extLst>
+                  <a:ext uri="{FF2B5EF4-FFF2-40B4-BE49-F238E27FC236}">
+                    <a16:creationId xmlns:a16="http://schemas.microsoft.com/office/drawing/2014/main" id="{14C93156-BC6F-4B0E-A04D-E30DC0BEE682}"/>
+                  </a:ext>
+                </a:extLst>
+              </p:cNvPr>
+              <p:cNvSpPr txBox="1"/>
+              <p:nvPr/>
+            </p:nvSpPr>
+            <p:spPr>
+              <a:xfrm>
+                <a:off x="7217803" y="4850962"/>
+                <a:ext cx="650884" cy="809389"/>
+              </a:xfrm>
+              <a:prstGeom prst="rect">
+                <a:avLst/>
+              </a:prstGeom>
+              <a:noFill/>
+            </p:spPr>
+            <p:txBody>
+              <a:bodyPr wrap="none" lIns="0" tIns="0" rIns="0" bIns="0" rtlCol="0">
+                <a:spAutoFit/>
+              </a:bodyPr>
+              <a:lstStyle/>
+              <a:p>
+                <a14:m>
+                  <m:oMathPara xmlns:m="http://schemas.openxmlformats.org/officeDocument/2006/math">
+                    <m:oMathParaPr>
+                      <m:jc m:val="centerGroup"/>
+                    </m:oMathParaPr>
+                    <m:oMath xmlns:m="http://schemas.openxmlformats.org/officeDocument/2006/math">
+                      <m:r>
+                        <a:rPr lang="en-GB" sz="2800" b="0" i="1" smtClean="0">
+                          <a:solidFill>
+                            <a:srgbClr val="437FBB"/>
+                          </a:solidFill>
+                          <a:latin typeface="Cambria Math" panose="02040503050406030204" pitchFamily="18" charset="0"/>
+                        </a:rPr>
+                        <m:t>=</m:t>
+                      </m:r>
+                      <m:f>
+                        <m:fPr>
+                          <m:ctrlPr>
+                            <a:rPr lang="es-CL" sz="2800" i="1" smtClean="0">
+                              <a:solidFill>
+                                <a:srgbClr val="437FBB"/>
+                              </a:solidFill>
+                              <a:latin typeface="Cambria Math" panose="02040503050406030204" pitchFamily="18" charset="0"/>
+                            </a:rPr>
+                          </m:ctrlPr>
+                        </m:fPr>
+                        <m:num>
+                          <m:r>
+                            <a:rPr lang="en-GB" sz="2800" b="0" i="1" smtClean="0">
+                              <a:solidFill>
+                                <a:srgbClr val="437FBB"/>
+                              </a:solidFill>
+                              <a:latin typeface="Cambria Math" panose="02040503050406030204" pitchFamily="18" charset="0"/>
+                            </a:rPr>
+                            <m:t>1</m:t>
+                          </m:r>
+                        </m:num>
+                        <m:den>
+                          <m:r>
+                            <a:rPr lang="en-GB" sz="2800" b="0" i="1" smtClean="0">
+                              <a:solidFill>
+                                <a:srgbClr val="437FBB"/>
+                              </a:solidFill>
+                              <a:latin typeface="Cambria Math" panose="02040503050406030204" pitchFamily="18" charset="0"/>
+                            </a:rPr>
+                            <m:t>𝑥</m:t>
+                          </m:r>
+                        </m:den>
+                      </m:f>
+                    </m:oMath>
+                  </m:oMathPara>
+                </a14:m>
+                <a:endParaRPr lang="es-CL" sz="2800" dirty="0">
+                  <a:solidFill>
+                    <a:srgbClr val="6697C8"/>
+                  </a:solidFill>
+                </a:endParaRPr>
+              </a:p>
+            </p:txBody>
+          </p:sp>
+        </mc:Choice>
+        <mc:Fallback>
+          <p:sp>
+            <p:nvSpPr>
+              <p:cNvPr id="11" name="TextBox 10">
+                <a:extLst>
+                  <a:ext uri="{FF2B5EF4-FFF2-40B4-BE49-F238E27FC236}">
+                    <a16:creationId xmlns:a16="http://schemas.microsoft.com/office/drawing/2014/main" id="{14C93156-BC6F-4B0E-A04D-E30DC0BEE682}"/>
+                  </a:ext>
+                </a:extLst>
+              </p:cNvPr>
+              <p:cNvSpPr txBox="1">
+                <a:spLocks noRot="1" noChangeAspect="1" noMove="1" noResize="1" noEditPoints="1" noAdjustHandles="1" noChangeArrowheads="1" noChangeShapeType="1" noTextEdit="1"/>
+              </p:cNvSpPr>
+              <p:nvPr/>
+            </p:nvSpPr>
+            <p:spPr>
+              <a:xfrm>
+                <a:off x="7217803" y="4850962"/>
+                <a:ext cx="650884" cy="809389"/>
+              </a:xfrm>
+              <a:prstGeom prst="rect">
+                <a:avLst/>
+              </a:prstGeom>
+              <a:blipFill>
+                <a:blip r:embed="rId3"/>
+                <a:stretch>
+                  <a:fillRect/>
+                </a:stretch>
+              </a:blipFill>
+            </p:spPr>
+            <p:txBody>
+              <a:bodyPr/>
+              <a:lstStyle/>
+              <a:p>
+                <a:r>
+                  <a:rPr lang="es-CL">
+                    <a:noFill/>
+                  </a:rPr>
+                  <a:t> </a:t>
+                </a:r>
+              </a:p>
+            </p:txBody>
+          </p:sp>
+        </mc:Fallback>
+      </mc:AlternateContent>
+      <mc:AlternateContent xmlns:mc="http://schemas.openxmlformats.org/markup-compatibility/2006">
+        <mc:Choice xmlns:a14="http://schemas.microsoft.com/office/drawing/2010/main" Requires="a14">
+          <p:sp>
+            <p:nvSpPr>
+              <p:cNvPr id="12" name="TextBox 11">
+                <a:extLst>
+                  <a:ext uri="{FF2B5EF4-FFF2-40B4-BE49-F238E27FC236}">
+                    <a16:creationId xmlns:a16="http://schemas.microsoft.com/office/drawing/2014/main" id="{A1F10414-4438-41DD-B145-F2232F740943}"/>
+                  </a:ext>
+                </a:extLst>
+              </p:cNvPr>
+              <p:cNvSpPr txBox="1"/>
+              <p:nvPr/>
+            </p:nvSpPr>
+            <p:spPr>
+              <a:xfrm>
+                <a:off x="886040" y="4509728"/>
+                <a:ext cx="1040157" cy="1008225"/>
+              </a:xfrm>
+              <a:prstGeom prst="rect">
+                <a:avLst/>
+              </a:prstGeom>
+              <a:noFill/>
+            </p:spPr>
+            <p:txBody>
+              <a:bodyPr wrap="none" lIns="0" tIns="0" rIns="0" bIns="0" rtlCol="0">
+                <a:spAutoFit/>
+              </a:bodyPr>
+              <a:lstStyle/>
+              <a:p>
+                <a14:m>
+                  <m:oMathPara xmlns:m="http://schemas.openxmlformats.org/officeDocument/2006/math">
+                    <m:oMathParaPr>
+                      <m:jc m:val="centerGroup"/>
+                    </m:oMathParaPr>
+                    <m:oMath xmlns:m="http://schemas.openxmlformats.org/officeDocument/2006/math">
+                      <m:nary>
+                        <m:naryPr>
+                          <m:chr m:val="∑"/>
+                          <m:ctrlPr>
+                            <a:rPr lang="es-CL" sz="2400" i="1" smtClean="0">
+                              <a:solidFill>
+                                <a:srgbClr val="F67F1E"/>
+                              </a:solidFill>
+                              <a:latin typeface="Cambria Math" panose="02040503050406030204" pitchFamily="18" charset="0"/>
+                            </a:rPr>
+                          </m:ctrlPr>
+                        </m:naryPr>
+                        <m:sub>
+                          <m:r>
+                            <m:rPr>
+                              <m:brk m:alnAt="23"/>
+                            </m:rPr>
+                            <a:rPr lang="en-GB" sz="2400" b="0" i="1" smtClean="0">
+                              <a:solidFill>
+                                <a:srgbClr val="F67F1E"/>
+                              </a:solidFill>
+                              <a:latin typeface="Cambria Math" panose="02040503050406030204" pitchFamily="18" charset="0"/>
+                            </a:rPr>
+                            <m:t>𝑥</m:t>
+                          </m:r>
+                          <m:r>
+                            <a:rPr lang="en-GB" sz="2400" b="0" i="1" smtClean="0">
+                              <a:solidFill>
+                                <a:srgbClr val="F67F1E"/>
+                              </a:solidFill>
+                              <a:latin typeface="Cambria Math" panose="02040503050406030204" pitchFamily="18" charset="0"/>
+                            </a:rPr>
+                            <m:t>=1</m:t>
+                          </m:r>
+                        </m:sub>
+                        <m:sup>
+                          <m:r>
+                            <a:rPr lang="en-GB" sz="2400" b="0" i="1" smtClean="0">
+                              <a:solidFill>
+                                <a:srgbClr val="F67F1E"/>
+                              </a:solidFill>
+                              <a:latin typeface="Cambria Math" panose="02040503050406030204" pitchFamily="18" charset="0"/>
+                            </a:rPr>
+                            <m:t>𝑛</m:t>
+                          </m:r>
+                        </m:sup>
+                        <m:e>
+                          <m:f>
+                            <m:fPr>
+                              <m:ctrlPr>
+                                <a:rPr lang="en-GB" sz="2400" b="0" i="1" smtClean="0">
+                                  <a:solidFill>
+                                    <a:srgbClr val="F67F1E"/>
+                                  </a:solidFill>
+                                  <a:latin typeface="Cambria Math" panose="02040503050406030204" pitchFamily="18" charset="0"/>
+                                </a:rPr>
+                              </m:ctrlPr>
+                            </m:fPr>
+                            <m:num>
+                              <m:r>
+                                <a:rPr lang="en-GB" sz="2400" b="0" i="1" smtClean="0">
+                                  <a:solidFill>
+                                    <a:srgbClr val="F67F1E"/>
+                                  </a:solidFill>
+                                  <a:latin typeface="Cambria Math" panose="02040503050406030204" pitchFamily="18" charset="0"/>
+                                </a:rPr>
+                                <m:t>1</m:t>
+                              </m:r>
+                            </m:num>
+                            <m:den>
+                              <m:r>
+                                <a:rPr lang="en-GB" sz="2400" b="0" i="1" smtClean="0">
+                                  <a:solidFill>
+                                    <a:srgbClr val="F67F1E"/>
+                                  </a:solidFill>
+                                  <a:latin typeface="Cambria Math" panose="02040503050406030204" pitchFamily="18" charset="0"/>
+                                </a:rPr>
+                                <m:t>𝑥</m:t>
+                              </m:r>
+                            </m:den>
+                          </m:f>
+                        </m:e>
+                      </m:nary>
+                      <m:r>
+                        <a:rPr lang="en-GB" sz="2400" b="0" i="1" smtClean="0">
+                          <a:solidFill>
+                            <a:srgbClr val="F67F1E"/>
+                          </a:solidFill>
+                          <a:latin typeface="Cambria Math" panose="02040503050406030204" pitchFamily="18" charset="0"/>
+                        </a:rPr>
+                        <m:t>=</m:t>
+                      </m:r>
+                    </m:oMath>
+                  </m:oMathPara>
+                </a14:m>
+                <a:endParaRPr lang="es-CL" sz="2400" dirty="0">
+                  <a:solidFill>
+                    <a:srgbClr val="F67F1E"/>
+                  </a:solidFill>
+                </a:endParaRPr>
+              </a:p>
+            </p:txBody>
+          </p:sp>
+        </mc:Choice>
+        <mc:Fallback>
+          <p:sp>
+            <p:nvSpPr>
+              <p:cNvPr id="12" name="TextBox 11">
+                <a:extLst>
+                  <a:ext uri="{FF2B5EF4-FFF2-40B4-BE49-F238E27FC236}">
+                    <a16:creationId xmlns:a16="http://schemas.microsoft.com/office/drawing/2014/main" id="{A1F10414-4438-41DD-B145-F2232F740943}"/>
+                  </a:ext>
+                </a:extLst>
+              </p:cNvPr>
+              <p:cNvSpPr txBox="1">
+                <a:spLocks noRot="1" noChangeAspect="1" noMove="1" noResize="1" noEditPoints="1" noAdjustHandles="1" noChangeArrowheads="1" noChangeShapeType="1" noTextEdit="1"/>
+              </p:cNvSpPr>
+              <p:nvPr/>
+            </p:nvSpPr>
+            <p:spPr>
+              <a:xfrm>
+                <a:off x="886040" y="4509728"/>
+                <a:ext cx="1040157" cy="1008225"/>
+              </a:xfrm>
+              <a:prstGeom prst="rect">
+                <a:avLst/>
+              </a:prstGeom>
+              <a:blipFill>
+                <a:blip r:embed="rId4"/>
+                <a:stretch>
+                  <a:fillRect/>
+                </a:stretch>
+              </a:blipFill>
+            </p:spPr>
+            <p:txBody>
+              <a:bodyPr/>
+              <a:lstStyle/>
+              <a:p>
+                <a:r>
+                  <a:rPr lang="es-CL">
+                    <a:noFill/>
+                  </a:rPr>
+                  <a:t> </a:t>
+                </a:r>
+              </a:p>
+            </p:txBody>
+          </p:sp>
+        </mc:Fallback>
+      </mc:AlternateContent>
     </p:spTree>
     <p:extLst>
       <p:ext uri="{BB962C8B-B14F-4D97-AF65-F5344CB8AC3E}">
@@ -14599,8 +15060,8 @@
           <a:chExt cx="0" cy="0"/>
         </a:xfrm>
       </p:grpSpPr>
-      <mc:AlternateContent xmlns:mc="http://schemas.openxmlformats.org/markup-compatibility/2006" xmlns:a14="http://schemas.microsoft.com/office/drawing/2010/main">
-        <mc:Choice Requires="a14">
+      <mc:AlternateContent xmlns:mc="http://schemas.openxmlformats.org/markup-compatibility/2006">
+        <mc:Choice xmlns:a14="http://schemas.microsoft.com/office/drawing/2010/main" Requires="a14">
           <p:sp>
             <p:nvSpPr>
               <p:cNvPr id="2" name="Marcador de contenido 1">
@@ -14666,6 +15127,9 @@
                           </m:r>
                           <m:r>
                             <a:rPr lang="es-CL" smtClean="0">
+                              <a:solidFill>
+                                <a:srgbClr val="FF0000"/>
+                              </a:solidFill>
                               <a:latin typeface="Cambria Math" panose="02040503050406030204" pitchFamily="18" charset="0"/>
                             </a:rPr>
                             <m:t>2</m:t>
@@ -15057,7 +15521,7 @@
             </p:txBody>
           </p:sp>
         </mc:Choice>
-        <mc:Fallback xmlns="">
+        <mc:Fallback>
           <p:sp>
             <p:nvSpPr>
               <p:cNvPr id="2" name="Marcador de contenido 1">
@@ -15594,8 +16058,8 @@
           <a:chExt cx="0" cy="0"/>
         </a:xfrm>
       </p:grpSpPr>
-      <mc:AlternateContent xmlns:mc="http://schemas.openxmlformats.org/markup-compatibility/2006">
-        <mc:Choice xmlns:a14="http://schemas.microsoft.com/office/drawing/2010/main" Requires="a14">
+      <mc:AlternateContent xmlns:mc="http://schemas.openxmlformats.org/markup-compatibility/2006" xmlns:a14="http://schemas.microsoft.com/office/drawing/2010/main">
+        <mc:Choice Requires="a14">
           <p:sp>
             <p:nvSpPr>
               <p:cNvPr id="2" name="Content Placeholder 1">
@@ -15717,7 +16181,7 @@
             </p:txBody>
           </p:sp>
         </mc:Choice>
-        <mc:Fallback>
+        <mc:Fallback xmlns="">
           <p:sp>
             <p:nvSpPr>
               <p:cNvPr id="2" name="Content Placeholder 1">
@@ -15894,8 +16358,8 @@
           <a:chExt cx="0" cy="0"/>
         </a:xfrm>
       </p:grpSpPr>
-      <mc:AlternateContent xmlns:mc="http://schemas.openxmlformats.org/markup-compatibility/2006">
-        <mc:Choice xmlns:a14="http://schemas.microsoft.com/office/drawing/2010/main" Requires="a14">
+      <mc:AlternateContent xmlns:mc="http://schemas.openxmlformats.org/markup-compatibility/2006" xmlns:a14="http://schemas.microsoft.com/office/drawing/2010/main">
+        <mc:Choice Requires="a14">
           <p:sp>
             <p:nvSpPr>
               <p:cNvPr id="2" name="Content Placeholder 1">
@@ -16017,7 +16481,7 @@
             </p:txBody>
           </p:sp>
         </mc:Choice>
-        <mc:Fallback>
+        <mc:Fallback xmlns="">
           <p:sp>
             <p:nvSpPr>
               <p:cNvPr id="2" name="Content Placeholder 1">
@@ -16678,8 +17142,8 @@
           <a:chExt cx="0" cy="0"/>
         </a:xfrm>
       </p:grpSpPr>
-      <mc:AlternateContent xmlns:mc="http://schemas.openxmlformats.org/markup-compatibility/2006">
-        <mc:Choice xmlns:a14="http://schemas.microsoft.com/office/drawing/2010/main" Requires="a14">
+      <mc:AlternateContent xmlns:mc="http://schemas.openxmlformats.org/markup-compatibility/2006" xmlns:a14="http://schemas.microsoft.com/office/drawing/2010/main">
+        <mc:Choice Requires="a14">
           <p:sp>
             <p:nvSpPr>
               <p:cNvPr id="2" name="Content Placeholder 1">
@@ -16801,7 +17265,7 @@
             </p:txBody>
           </p:sp>
         </mc:Choice>
-        <mc:Fallback>
+        <mc:Fallback xmlns="">
           <p:sp>
             <p:nvSpPr>
               <p:cNvPr id="2" name="Content Placeholder 1">
@@ -16978,8 +17442,8 @@
           <a:chExt cx="0" cy="0"/>
         </a:xfrm>
       </p:grpSpPr>
-      <mc:AlternateContent xmlns:mc="http://schemas.openxmlformats.org/markup-compatibility/2006">
-        <mc:Choice xmlns:a14="http://schemas.microsoft.com/office/drawing/2010/main" Requires="a14">
+      <mc:AlternateContent xmlns:mc="http://schemas.openxmlformats.org/markup-compatibility/2006" xmlns:a14="http://schemas.microsoft.com/office/drawing/2010/main">
+        <mc:Choice Requires="a14">
           <p:sp>
             <p:nvSpPr>
               <p:cNvPr id="2" name="Content Placeholder 1">
@@ -17101,7 +17565,7 @@
             </p:txBody>
           </p:sp>
         </mc:Choice>
-        <mc:Fallback>
+        <mc:Fallback xmlns="">
           <p:sp>
             <p:nvSpPr>
               <p:cNvPr id="2" name="Content Placeholder 1">

</xml_diff>